<commit_message>
Pickup and delivery menu
</commit_message>
<xml_diff>
--- a/022_91893+_+91897+Documentation.pptx
+++ b/022_91893+_+91897+Documentation.pptx
@@ -5,7 +5,7 @@
     <p:sldMasterId id="2147483659" r:id="rId4"/>
   </p:sldMasterIdLst>
   <p:notesMasterIdLst>
-    <p:notesMasterId r:id="rId15"/>
+    <p:notesMasterId r:id="rId17"/>
   </p:notesMasterIdLst>
   <p:sldIdLst>
     <p:sldId id="256" r:id="rId5"/>
@@ -15,9 +15,11 @@
     <p:sldId id="260" r:id="rId9"/>
     <p:sldId id="265" r:id="rId10"/>
     <p:sldId id="263" r:id="rId11"/>
-    <p:sldId id="264" r:id="rId12"/>
-    <p:sldId id="261" r:id="rId13"/>
-    <p:sldId id="262" r:id="rId14"/>
+    <p:sldId id="266" r:id="rId12"/>
+    <p:sldId id="267" r:id="rId13"/>
+    <p:sldId id="264" r:id="rId14"/>
+    <p:sldId id="261" r:id="rId15"/>
+    <p:sldId id="262" r:id="rId16"/>
   </p:sldIdLst>
   <p:sldSz cx="9144000" cy="5143500" type="screen16x9"/>
   <p:notesSz cx="6858000" cy="9144000"/>
@@ -856,6 +858,240 @@
   <p:cSld>
     <p:spTree>
       <p:nvGrpSpPr>
+        <p:cNvPr id="1" name="Shape 74"/>
+        <p:cNvGrpSpPr/>
+        <p:nvPr/>
+      </p:nvGrpSpPr>
+      <p:grpSpPr>
+        <a:xfrm>
+          <a:off x="0" y="0"/>
+          <a:ext cx="0" cy="0"/>
+          <a:chOff x="0" y="0"/>
+          <a:chExt cx="0" cy="0"/>
+        </a:xfrm>
+      </p:grpSpPr>
+      <p:sp>
+        <p:nvSpPr>
+          <p:cNvPr id="75" name="Google Shape;75;gac10fef634_0_20:notes"/>
+          <p:cNvSpPr>
+            <a:spLocks noGrp="1" noRot="1" noChangeAspect="1"/>
+          </p:cNvSpPr>
+          <p:nvPr>
+            <p:ph type="sldImg" idx="2"/>
+          </p:nvPr>
+        </p:nvSpPr>
+        <p:spPr>
+          <a:xfrm>
+            <a:off x="381000" y="685800"/>
+            <a:ext cx="6096000" cy="3429000"/>
+          </a:xfrm>
+          <a:custGeom>
+            <a:avLst/>
+            <a:gdLst/>
+            <a:ahLst/>
+            <a:cxnLst/>
+            <a:rect l="l" t="t" r="r" b="b"/>
+            <a:pathLst>
+              <a:path w="120000" h="120000" extrusionOk="0">
+                <a:moveTo>
+                  <a:pt x="0" y="0"/>
+                </a:moveTo>
+                <a:lnTo>
+                  <a:pt x="120000" y="0"/>
+                </a:lnTo>
+                <a:lnTo>
+                  <a:pt x="120000" y="120000"/>
+                </a:lnTo>
+                <a:lnTo>
+                  <a:pt x="0" y="120000"/>
+                </a:lnTo>
+                <a:close/>
+              </a:path>
+            </a:pathLst>
+          </a:custGeom>
+        </p:spPr>
+      </p:sp>
+      <p:sp>
+        <p:nvSpPr>
+          <p:cNvPr id="76" name="Google Shape;76;gac10fef634_0_20:notes"/>
+          <p:cNvSpPr txBox="1">
+            <a:spLocks noGrp="1"/>
+          </p:cNvSpPr>
+          <p:nvPr>
+            <p:ph type="body" idx="1"/>
+          </p:nvPr>
+        </p:nvSpPr>
+        <p:spPr>
+          <a:xfrm>
+            <a:off x="685800" y="4343400"/>
+            <a:ext cx="5486400" cy="4114800"/>
+          </a:xfrm>
+          <a:prstGeom prst="rect">
+            <a:avLst/>
+          </a:prstGeom>
+        </p:spPr>
+        <p:txBody>
+          <a:bodyPr spcFirstLastPara="1" wrap="square" lIns="91425" tIns="91425" rIns="91425" bIns="91425" anchor="t" anchorCtr="0">
+            <a:noAutofit/>
+          </a:bodyPr>
+          <a:lstStyle/>
+          <a:p>
+            <a:pPr marL="0" lvl="0" indent="0" algn="l" rtl="0">
+              <a:spcBef>
+                <a:spcPts val="0"/>
+              </a:spcBef>
+              <a:spcAft>
+                <a:spcPts val="0"/>
+              </a:spcAft>
+              <a:buNone/>
+            </a:pPr>
+            <a:endParaRPr/>
+          </a:p>
+        </p:txBody>
+      </p:sp>
+    </p:spTree>
+    <p:extLst>
+      <p:ext uri="{BB962C8B-B14F-4D97-AF65-F5344CB8AC3E}">
+        <p14:creationId xmlns:p14="http://schemas.microsoft.com/office/powerpoint/2010/main" val="2633653212"/>
+      </p:ext>
+    </p:extLst>
+  </p:cSld>
+  <p:clrMapOvr>
+    <a:masterClrMapping/>
+  </p:clrMapOvr>
+</p:notes>
+</file>
+
+<file path=ppt/notesSlides/notesSlide11.xml><?xml version="1.0" encoding="utf-8"?>
+<p:notes xmlns:a="http://schemas.openxmlformats.org/drawingml/2006/main" xmlns:r="http://schemas.openxmlformats.org/officeDocument/2006/relationships" xmlns:p="http://schemas.openxmlformats.org/presentationml/2006/main" showMasterSp="0" showMasterPhAnim="0">
+  <p:cSld>
+    <p:spTree>
+      <p:nvGrpSpPr>
+        <p:cNvPr id="1" name="Shape 80"/>
+        <p:cNvGrpSpPr/>
+        <p:nvPr/>
+      </p:nvGrpSpPr>
+      <p:grpSpPr>
+        <a:xfrm>
+          <a:off x="0" y="0"/>
+          <a:ext cx="0" cy="0"/>
+          <a:chOff x="0" y="0"/>
+          <a:chExt cx="0" cy="0"/>
+        </a:xfrm>
+      </p:grpSpPr>
+      <p:sp>
+        <p:nvSpPr>
+          <p:cNvPr id="81" name="Google Shape;81;gac10fef634_0_25:notes"/>
+          <p:cNvSpPr>
+            <a:spLocks noGrp="1" noRot="1" noChangeAspect="1"/>
+          </p:cNvSpPr>
+          <p:nvPr>
+            <p:ph type="sldImg" idx="2"/>
+          </p:nvPr>
+        </p:nvSpPr>
+        <p:spPr>
+          <a:xfrm>
+            <a:off x="381000" y="685800"/>
+            <a:ext cx="6096000" cy="3429000"/>
+          </a:xfrm>
+          <a:custGeom>
+            <a:avLst/>
+            <a:gdLst/>
+            <a:ahLst/>
+            <a:cxnLst/>
+            <a:rect l="l" t="t" r="r" b="b"/>
+            <a:pathLst>
+              <a:path w="120000" h="120000" extrusionOk="0">
+                <a:moveTo>
+                  <a:pt x="0" y="0"/>
+                </a:moveTo>
+                <a:lnTo>
+                  <a:pt x="120000" y="0"/>
+                </a:lnTo>
+                <a:lnTo>
+                  <a:pt x="120000" y="120000"/>
+                </a:lnTo>
+                <a:lnTo>
+                  <a:pt x="0" y="120000"/>
+                </a:lnTo>
+                <a:close/>
+              </a:path>
+            </a:pathLst>
+          </a:custGeom>
+        </p:spPr>
+      </p:sp>
+      <p:sp>
+        <p:nvSpPr>
+          <p:cNvPr id="82" name="Google Shape;82;gac10fef634_0_25:notes"/>
+          <p:cNvSpPr txBox="1">
+            <a:spLocks noGrp="1"/>
+          </p:cNvSpPr>
+          <p:nvPr>
+            <p:ph type="body" idx="1"/>
+          </p:nvPr>
+        </p:nvSpPr>
+        <p:spPr>
+          <a:xfrm>
+            <a:off x="685800" y="4343400"/>
+            <a:ext cx="5486400" cy="4114800"/>
+          </a:xfrm>
+          <a:prstGeom prst="rect">
+            <a:avLst/>
+          </a:prstGeom>
+        </p:spPr>
+        <p:txBody>
+          <a:bodyPr spcFirstLastPara="1" wrap="square" lIns="91425" tIns="91425" rIns="91425" bIns="91425" anchor="t" anchorCtr="0">
+            <a:noAutofit/>
+          </a:bodyPr>
+          <a:lstStyle/>
+          <a:p>
+            <a:pPr marL="0" lvl="0" indent="0" algn="l" rtl="0">
+              <a:spcBef>
+                <a:spcPts val="0"/>
+              </a:spcBef>
+              <a:spcAft>
+                <a:spcPts val="0"/>
+              </a:spcAft>
+              <a:buClr>
+                <a:schemeClr val="dk1"/>
+              </a:buClr>
+              <a:buSzPts val="1100"/>
+              <a:buFont typeface="Arial"/>
+              <a:buNone/>
+            </a:pPr>
+            <a:r>
+              <a:rPr lang="en"/>
+              <a:t>Your version control evidence should go here.  This could be in the form of annotated screenshots which show you you managed this process or you could make a brief screencast explaining how you implemented version control.</a:t>
+            </a:r>
+            <a:endParaRPr/>
+          </a:p>
+          <a:p>
+            <a:pPr marL="0" lvl="0" indent="0" algn="l" rtl="0">
+              <a:spcBef>
+                <a:spcPts val="0"/>
+              </a:spcBef>
+              <a:spcAft>
+                <a:spcPts val="0"/>
+              </a:spcAft>
+              <a:buNone/>
+            </a:pPr>
+            <a:endParaRPr/>
+          </a:p>
+        </p:txBody>
+      </p:sp>
+    </p:spTree>
+  </p:cSld>
+  <p:clrMapOvr>
+    <a:masterClrMapping/>
+  </p:clrMapOvr>
+</p:notes>
+</file>
+
+<file path=ppt/notesSlides/notesSlide12.xml><?xml version="1.0" encoding="utf-8"?>
+<p:notes xmlns:a="http://schemas.openxmlformats.org/drawingml/2006/main" xmlns:r="http://schemas.openxmlformats.org/officeDocument/2006/relationships" xmlns:p="http://schemas.openxmlformats.org/presentationml/2006/main" showMasterSp="0" showMasterPhAnim="0">
+  <p:cSld>
+    <p:spTree>
+      <p:nvGrpSpPr>
         <p:cNvPr id="1" name="Shape 86"/>
         <p:cNvGrpSpPr/>
         <p:nvPr/>
@@ -1717,7 +1953,7 @@
     </p:spTree>
     <p:extLst>
       <p:ext uri="{BB962C8B-B14F-4D97-AF65-F5344CB8AC3E}">
-        <p14:creationId xmlns:p14="http://schemas.microsoft.com/office/powerpoint/2010/main" val="2633653212"/>
+        <p14:creationId xmlns:p14="http://schemas.microsoft.com/office/powerpoint/2010/main" val="1420111955"/>
       </p:ext>
     </p:extLst>
   </p:cSld>
@@ -1732,7 +1968,7 @@
   <p:cSld>
     <p:spTree>
       <p:nvGrpSpPr>
-        <p:cNvPr id="1" name="Shape 80"/>
+        <p:cNvPr id="1" name="Shape 69"/>
         <p:cNvGrpSpPr/>
         <p:nvPr/>
       </p:nvGrpSpPr>
@@ -1746,7 +1982,7 @@
       </p:grpSpPr>
       <p:sp>
         <p:nvSpPr>
-          <p:cNvPr id="81" name="Google Shape;81;gac10fef634_0_25:notes"/>
+          <p:cNvPr id="70" name="Google Shape;70;gac10fef634_0_16:notes"/>
           <p:cNvSpPr>
             <a:spLocks noGrp="1" noRot="1" noChangeAspect="1"/>
           </p:cNvSpPr>
@@ -1787,7 +2023,7 @@
       </p:sp>
       <p:sp>
         <p:nvSpPr>
-          <p:cNvPr id="82" name="Google Shape;82;gac10fef634_0_25:notes"/>
+          <p:cNvPr id="71" name="Google Shape;71;gac10fef634_0_16:notes"/>
           <p:cNvSpPr txBox="1">
             <a:spLocks noGrp="1"/>
           </p:cNvSpPr>
@@ -1817,27 +2053,6 @@
               <a:spcAft>
                 <a:spcPts val="0"/>
               </a:spcAft>
-              <a:buClr>
-                <a:schemeClr val="dk1"/>
-              </a:buClr>
-              <a:buSzPts val="1100"/>
-              <a:buFont typeface="Arial"/>
-              <a:buNone/>
-            </a:pPr>
-            <a:r>
-              <a:rPr lang="en"/>
-              <a:t>Your version control evidence should go here.  This could be in the form of annotated screenshots which show you you managed this process or you could make a brief screencast explaining how you implemented version control.</a:t>
-            </a:r>
-            <a:endParaRPr/>
-          </a:p>
-          <a:p>
-            <a:pPr marL="0" lvl="0" indent="0" algn="l" rtl="0">
-              <a:spcBef>
-                <a:spcPts val="0"/>
-              </a:spcBef>
-              <a:spcAft>
-                <a:spcPts val="0"/>
-              </a:spcAft>
               <a:buNone/>
             </a:pPr>
             <a:endParaRPr/>
@@ -1845,6 +2060,11 @@
         </p:txBody>
       </p:sp>
     </p:spTree>
+    <p:extLst>
+      <p:ext uri="{BB962C8B-B14F-4D97-AF65-F5344CB8AC3E}">
+        <p14:creationId xmlns:p14="http://schemas.microsoft.com/office/powerpoint/2010/main" val="110813422"/>
+      </p:ext>
+    </p:extLst>
   </p:cSld>
   <p:clrMapOvr>
     <a:masterClrMapping/>
@@ -6862,6 +7082,463 @@
 <file path=ppt/slides/slide10.xml><?xml version="1.0" encoding="utf-8"?>
 <p:sld xmlns:a="http://schemas.openxmlformats.org/drawingml/2006/main" xmlns:r="http://schemas.openxmlformats.org/officeDocument/2006/relationships" xmlns:p="http://schemas.openxmlformats.org/presentationml/2006/main">
   <p:cSld>
+    <p:spTree>
+      <p:nvGrpSpPr>
+        <p:cNvPr id="1" name="Shape 77"/>
+        <p:cNvGrpSpPr/>
+        <p:nvPr/>
+      </p:nvGrpSpPr>
+      <p:grpSpPr>
+        <a:xfrm>
+          <a:off x="0" y="0"/>
+          <a:ext cx="0" cy="0"/>
+          <a:chOff x="0" y="0"/>
+          <a:chExt cx="0" cy="0"/>
+        </a:xfrm>
+      </p:grpSpPr>
+      <p:sp>
+        <p:nvSpPr>
+          <p:cNvPr id="78" name="Google Shape;78;p17"/>
+          <p:cNvSpPr txBox="1">
+            <a:spLocks noGrp="1"/>
+          </p:cNvSpPr>
+          <p:nvPr>
+            <p:ph type="title"/>
+          </p:nvPr>
+        </p:nvSpPr>
+        <p:spPr>
+          <a:xfrm>
+            <a:off x="311700" y="445025"/>
+            <a:ext cx="8520600" cy="572700"/>
+          </a:xfrm>
+          <a:prstGeom prst="rect">
+            <a:avLst/>
+          </a:prstGeom>
+        </p:spPr>
+        <p:txBody>
+          <a:bodyPr spcFirstLastPara="1" wrap="square" lIns="91425" tIns="91425" rIns="91425" bIns="91425" anchor="t" anchorCtr="0">
+            <a:noAutofit/>
+          </a:bodyPr>
+          <a:lstStyle/>
+          <a:p>
+            <a:pPr marL="0" lvl="0" indent="0" algn="l" rtl="0">
+              <a:spcBef>
+                <a:spcPts val="0"/>
+              </a:spcBef>
+              <a:spcAft>
+                <a:spcPts val="0"/>
+              </a:spcAft>
+              <a:buNone/>
+            </a:pPr>
+            <a:r>
+              <a:rPr lang="en" dirty="0"/>
+              <a:t>Component 2 - Test Plan (?and screenshot)</a:t>
+            </a:r>
+            <a:br>
+              <a:rPr lang="en" dirty="0"/>
+            </a:br>
+            <a:br>
+              <a:rPr lang="en" dirty="0"/>
+            </a:br>
+            <a:endParaRPr dirty="0"/>
+          </a:p>
+        </p:txBody>
+      </p:sp>
+      <p:graphicFrame>
+        <p:nvGraphicFramePr>
+          <p:cNvPr id="79" name="Google Shape;79;p17"/>
+          <p:cNvGraphicFramePr/>
+          <p:nvPr>
+            <p:extLst>
+              <p:ext uri="{D42A27DB-BD31-4B8C-83A1-F6EECF244321}">
+                <p14:modId xmlns:p14="http://schemas.microsoft.com/office/powerpoint/2010/main" val="1598781337"/>
+              </p:ext>
+            </p:extLst>
+          </p:nvPr>
+        </p:nvGraphicFramePr>
+        <p:xfrm>
+          <a:off x="311700" y="4041405"/>
+          <a:ext cx="8520600" cy="1462980"/>
+        </p:xfrm>
+        <a:graphic>
+          <a:graphicData uri="http://schemas.openxmlformats.org/drawingml/2006/table">
+            <a:tbl>
+              <a:tblPr>
+                <a:noFill/>
+                <a:tableStyleId>{E1099E06-0E6B-448D-9D27-60429F06E6F4}</a:tableStyleId>
+              </a:tblPr>
+              <a:tblGrid>
+                <a:gridCol w="4260300">
+                  <a:extLst>
+                    <a:ext uri="{9D8B030D-6E8A-4147-A177-3AD203B41FA5}">
+                      <a16:colId xmlns:a16="http://schemas.microsoft.com/office/drawing/2014/main" val="20000"/>
+                    </a:ext>
+                  </a:extLst>
+                </a:gridCol>
+                <a:gridCol w="4260300">
+                  <a:extLst>
+                    <a:ext uri="{9D8B030D-6E8A-4147-A177-3AD203B41FA5}">
+                      <a16:colId xmlns:a16="http://schemas.microsoft.com/office/drawing/2014/main" val="20001"/>
+                    </a:ext>
+                  </a:extLst>
+                </a:gridCol>
+              </a:tblGrid>
+              <a:tr h="381000">
+                <a:tc>
+                  <a:txBody>
+                    <a:bodyPr/>
+                    <a:lstStyle/>
+                    <a:p>
+                      <a:pPr marL="0" lvl="0" indent="0" algn="l" rtl="0">
+                        <a:spcBef>
+                          <a:spcPts val="0"/>
+                        </a:spcBef>
+                        <a:spcAft>
+                          <a:spcPts val="0"/>
+                        </a:spcAft>
+                        <a:buNone/>
+                      </a:pPr>
+                      <a:r>
+                        <a:rPr lang="en" sz="1800" b="1" dirty="0"/>
+                        <a:t>Test Case</a:t>
+                      </a:r>
+                      <a:endParaRPr sz="1800" b="1" dirty="0"/>
+                    </a:p>
+                  </a:txBody>
+                  <a:tcPr marL="91425" marR="91425" marT="91425" marB="91425">
+                    <a:solidFill>
+                      <a:srgbClr val="CCCCCC"/>
+                    </a:solidFill>
+                  </a:tcPr>
+                </a:tc>
+                <a:tc>
+                  <a:txBody>
+                    <a:bodyPr/>
+                    <a:lstStyle/>
+                    <a:p>
+                      <a:pPr marL="0" lvl="0" indent="0" algn="l" rtl="0">
+                        <a:spcBef>
+                          <a:spcPts val="0"/>
+                        </a:spcBef>
+                        <a:spcAft>
+                          <a:spcPts val="0"/>
+                        </a:spcAft>
+                        <a:buNone/>
+                      </a:pPr>
+                      <a:r>
+                        <a:rPr lang="en" sz="1800" b="1"/>
+                        <a:t>Expected Values</a:t>
+                      </a:r>
+                      <a:endParaRPr sz="1800" b="1"/>
+                    </a:p>
+                  </a:txBody>
+                  <a:tcPr marL="91425" marR="91425" marT="91425" marB="91425">
+                    <a:solidFill>
+                      <a:srgbClr val="CCCCCC"/>
+                    </a:solidFill>
+                  </a:tcPr>
+                </a:tc>
+                <a:extLst>
+                  <a:ext uri="{0D108BD9-81ED-4DB2-BD59-A6C34878D82A}">
+                    <a16:rowId xmlns:a16="http://schemas.microsoft.com/office/drawing/2014/main" val="10000"/>
+                  </a:ext>
+                </a:extLst>
+              </a:tr>
+              <a:tr h="396200">
+                <a:tc>
+                  <a:txBody>
+                    <a:bodyPr/>
+                    <a:lstStyle/>
+                    <a:p>
+                      <a:pPr marL="0" lvl="0" indent="0" algn="l" rtl="0">
+                        <a:spcBef>
+                          <a:spcPts val="0"/>
+                        </a:spcBef>
+                        <a:spcAft>
+                          <a:spcPts val="0"/>
+                        </a:spcAft>
+                        <a:buNone/>
+                      </a:pPr>
+                      <a:r>
+                        <a:rPr lang="en-US" sz="1800" dirty="0"/>
+                        <a:t>Run program</a:t>
+                      </a:r>
+                      <a:endParaRPr sz="1800" dirty="0"/>
+                    </a:p>
+                  </a:txBody>
+                  <a:tcPr marL="91425" marR="91425" marT="91425" marB="91425"/>
+                </a:tc>
+                <a:tc>
+                  <a:txBody>
+                    <a:bodyPr/>
+                    <a:lstStyle/>
+                    <a:p>
+                      <a:pPr marL="0" lvl="0" indent="0" algn="l" rtl="0">
+                        <a:spcBef>
+                          <a:spcPts val="0"/>
+                        </a:spcBef>
+                        <a:spcAft>
+                          <a:spcPts val="0"/>
+                        </a:spcAft>
+                        <a:buNone/>
+                      </a:pPr>
+                      <a:r>
+                        <a:rPr lang="en-US" sz="1800" dirty="0"/>
+                        <a:t>Main and welcome run correctly.</a:t>
+                      </a:r>
+                    </a:p>
+                    <a:p>
+                      <a:pPr marL="0" lvl="0" indent="0" algn="l" rtl="0">
+                        <a:spcBef>
+                          <a:spcPts val="0"/>
+                        </a:spcBef>
+                        <a:spcAft>
+                          <a:spcPts val="0"/>
+                        </a:spcAft>
+                        <a:buNone/>
+                      </a:pPr>
+                      <a:r>
+                        <a:rPr lang="en-US" sz="1800" dirty="0"/>
+                        <a:t>Welcome message prints with random name.</a:t>
+                      </a:r>
+                      <a:endParaRPr sz="1800" dirty="0"/>
+                    </a:p>
+                  </a:txBody>
+                  <a:tcPr marL="91425" marR="91425" marT="91425" marB="91425"/>
+                </a:tc>
+                <a:extLst>
+                  <a:ext uri="{0D108BD9-81ED-4DB2-BD59-A6C34878D82A}">
+                    <a16:rowId xmlns:a16="http://schemas.microsoft.com/office/drawing/2014/main" val="10001"/>
+                  </a:ext>
+                </a:extLst>
+              </a:tr>
+            </a:tbl>
+          </a:graphicData>
+        </a:graphic>
+      </p:graphicFrame>
+      <p:pic>
+        <p:nvPicPr>
+          <p:cNvPr id="4" name="Picture 3">
+            <a:extLst>
+              <a:ext uri="{FF2B5EF4-FFF2-40B4-BE49-F238E27FC236}">
+                <a16:creationId xmlns:a16="http://schemas.microsoft.com/office/drawing/2014/main" id="{9FA3FEA3-93DC-4863-83D8-D43DE08F33E4}"/>
+              </a:ext>
+            </a:extLst>
+          </p:cNvPr>
+          <p:cNvPicPr>
+            <a:picLocks noChangeAspect="1"/>
+          </p:cNvPicPr>
+          <p:nvPr/>
+        </p:nvPicPr>
+        <p:blipFill>
+          <a:blip r:embed="rId3"/>
+          <a:stretch>
+            <a:fillRect/>
+          </a:stretch>
+        </p:blipFill>
+        <p:spPr>
+          <a:xfrm>
+            <a:off x="0" y="1017725"/>
+            <a:ext cx="3503500" cy="1413106"/>
+          </a:xfrm>
+          <a:prstGeom prst="rect">
+            <a:avLst/>
+          </a:prstGeom>
+        </p:spPr>
+      </p:pic>
+      <p:pic>
+        <p:nvPicPr>
+          <p:cNvPr id="5" name="Picture 4">
+            <a:extLst>
+              <a:ext uri="{FF2B5EF4-FFF2-40B4-BE49-F238E27FC236}">
+                <a16:creationId xmlns:a16="http://schemas.microsoft.com/office/drawing/2014/main" id="{702EA7C5-6865-4037-AD46-0422C73CE936}"/>
+              </a:ext>
+            </a:extLst>
+          </p:cNvPr>
+          <p:cNvPicPr>
+            <a:picLocks noChangeAspect="1"/>
+          </p:cNvPicPr>
+          <p:nvPr/>
+        </p:nvPicPr>
+        <p:blipFill>
+          <a:blip r:embed="rId4"/>
+          <a:stretch>
+            <a:fillRect/>
+          </a:stretch>
+        </p:blipFill>
+        <p:spPr>
+          <a:xfrm>
+            <a:off x="0" y="2430831"/>
+            <a:ext cx="3503500" cy="1147755"/>
+          </a:xfrm>
+          <a:prstGeom prst="rect">
+            <a:avLst/>
+          </a:prstGeom>
+        </p:spPr>
+      </p:pic>
+      <p:pic>
+        <p:nvPicPr>
+          <p:cNvPr id="3" name="Picture 2">
+            <a:extLst>
+              <a:ext uri="{FF2B5EF4-FFF2-40B4-BE49-F238E27FC236}">
+                <a16:creationId xmlns:a16="http://schemas.microsoft.com/office/drawing/2014/main" id="{37248A6E-BFDC-4B38-AD41-6E3AE9890C8A}"/>
+              </a:ext>
+            </a:extLst>
+          </p:cNvPr>
+          <p:cNvPicPr>
+            <a:picLocks noChangeAspect="1"/>
+          </p:cNvPicPr>
+          <p:nvPr/>
+        </p:nvPicPr>
+        <p:blipFill>
+          <a:blip r:embed="rId5"/>
+          <a:stretch>
+            <a:fillRect/>
+          </a:stretch>
+        </p:blipFill>
+        <p:spPr>
+          <a:xfrm>
+            <a:off x="3564266" y="1878353"/>
+            <a:ext cx="5207268" cy="552478"/>
+          </a:xfrm>
+          <a:prstGeom prst="rect">
+            <a:avLst/>
+          </a:prstGeom>
+        </p:spPr>
+      </p:pic>
+    </p:spTree>
+    <p:extLst>
+      <p:ext uri="{BB962C8B-B14F-4D97-AF65-F5344CB8AC3E}">
+        <p14:creationId xmlns:p14="http://schemas.microsoft.com/office/powerpoint/2010/main" val="676409526"/>
+      </p:ext>
+    </p:extLst>
+  </p:cSld>
+  <p:clrMapOvr>
+    <a:masterClrMapping/>
+  </p:clrMapOvr>
+</p:sld>
+</file>
+
+<file path=ppt/slides/slide11.xml><?xml version="1.0" encoding="utf-8"?>
+<p:sld xmlns:a="http://schemas.openxmlformats.org/drawingml/2006/main" xmlns:r="http://schemas.openxmlformats.org/officeDocument/2006/relationships" xmlns:p="http://schemas.openxmlformats.org/presentationml/2006/main">
+  <p:cSld>
+    <p:bg>
+      <p:bgPr>
+        <a:solidFill>
+          <a:srgbClr val="D9EAD3"/>
+        </a:solidFill>
+        <a:effectLst/>
+      </p:bgPr>
+    </p:bg>
+    <p:spTree>
+      <p:nvGrpSpPr>
+        <p:cNvPr id="1" name="Shape 83"/>
+        <p:cNvGrpSpPr/>
+        <p:nvPr/>
+      </p:nvGrpSpPr>
+      <p:grpSpPr>
+        <a:xfrm>
+          <a:off x="0" y="0"/>
+          <a:ext cx="0" cy="0"/>
+          <a:chOff x="0" y="0"/>
+          <a:chExt cx="0" cy="0"/>
+        </a:xfrm>
+      </p:grpSpPr>
+      <p:sp>
+        <p:nvSpPr>
+          <p:cNvPr id="84" name="Google Shape;84;p18"/>
+          <p:cNvSpPr txBox="1">
+            <a:spLocks noGrp="1"/>
+          </p:cNvSpPr>
+          <p:nvPr>
+            <p:ph type="title"/>
+          </p:nvPr>
+        </p:nvSpPr>
+        <p:spPr>
+          <a:xfrm>
+            <a:off x="311700" y="445025"/>
+            <a:ext cx="8520600" cy="572700"/>
+          </a:xfrm>
+          <a:prstGeom prst="rect">
+            <a:avLst/>
+          </a:prstGeom>
+        </p:spPr>
+        <p:txBody>
+          <a:bodyPr spcFirstLastPara="1" wrap="square" lIns="91425" tIns="91425" rIns="91425" bIns="91425" anchor="t" anchorCtr="0">
+            <a:noAutofit/>
+          </a:bodyPr>
+          <a:lstStyle/>
+          <a:p>
+            <a:pPr marL="0" lvl="0" indent="0" algn="l" rtl="0">
+              <a:spcBef>
+                <a:spcPts val="0"/>
+              </a:spcBef>
+              <a:spcAft>
+                <a:spcPts val="0"/>
+              </a:spcAft>
+              <a:buNone/>
+            </a:pPr>
+            <a:r>
+              <a:rPr lang="en"/>
+              <a:t>Version Control Evidence</a:t>
+            </a:r>
+            <a:endParaRPr/>
+          </a:p>
+        </p:txBody>
+      </p:sp>
+      <p:sp>
+        <p:nvSpPr>
+          <p:cNvPr id="85" name="Google Shape;85;p18"/>
+          <p:cNvSpPr txBox="1">
+            <a:spLocks noGrp="1"/>
+          </p:cNvSpPr>
+          <p:nvPr>
+            <p:ph type="body" idx="1"/>
+          </p:nvPr>
+        </p:nvSpPr>
+        <p:spPr>
+          <a:xfrm>
+            <a:off x="311700" y="1152475"/>
+            <a:ext cx="8464200" cy="3739200"/>
+          </a:xfrm>
+          <a:prstGeom prst="rect">
+            <a:avLst/>
+          </a:prstGeom>
+        </p:spPr>
+        <p:txBody>
+          <a:bodyPr spcFirstLastPara="1" wrap="square" lIns="91425" tIns="91425" rIns="91425" bIns="91425" anchor="t" anchorCtr="0">
+            <a:noAutofit/>
+          </a:bodyPr>
+          <a:lstStyle/>
+          <a:p>
+            <a:pPr marL="0" lvl="0" indent="0" algn="l" rtl="0">
+              <a:spcBef>
+                <a:spcPts val="0"/>
+              </a:spcBef>
+              <a:spcAft>
+                <a:spcPts val="1600"/>
+              </a:spcAft>
+              <a:buNone/>
+            </a:pPr>
+            <a:r>
+              <a:rPr lang="en" i="1"/>
+              <a:t>Your version control evidence should go here.  This could be in the form of annotated screenshots which show you you managed this process or you could make a brief screencast explaining how you implemented version control.</a:t>
+            </a:r>
+            <a:endParaRPr i="1"/>
+          </a:p>
+        </p:txBody>
+      </p:sp>
+    </p:spTree>
+  </p:cSld>
+  <p:clrMapOvr>
+    <a:masterClrMapping/>
+  </p:clrMapOvr>
+</p:sld>
+</file>
+
+<file path=ppt/slides/slide12.xml><?xml version="1.0" encoding="utf-8"?>
+<p:sld xmlns:a="http://schemas.openxmlformats.org/drawingml/2006/main" xmlns:r="http://schemas.openxmlformats.org/officeDocument/2006/relationships" xmlns:p="http://schemas.openxmlformats.org/presentationml/2006/main">
+  <p:cSld>
     <p:bg>
       <p:bgPr>
         <a:solidFill>
@@ -8125,8 +8802,11 @@
             </a:pPr>
             <a:r>
               <a:rPr lang="en" dirty="0"/>
-              <a:t>Component 2 - Test Plan (?and screenshot)</a:t>
+              <a:t>Component 2 Version 1- Test Plan (and screenshot)</a:t>
             </a:r>
+            <a:br>
+              <a:rPr lang="en" dirty="0"/>
+            </a:br>
             <a:br>
               <a:rPr lang="en" dirty="0"/>
             </a:br>
@@ -8144,14 +8824,14 @@
           <p:nvPr>
             <p:extLst>
               <p:ext uri="{D42A27DB-BD31-4B8C-83A1-F6EECF244321}">
-                <p14:modId xmlns:p14="http://schemas.microsoft.com/office/powerpoint/2010/main" val="1598781337"/>
+                <p14:modId xmlns:p14="http://schemas.microsoft.com/office/powerpoint/2010/main" val="847029707"/>
               </p:ext>
             </p:extLst>
           </p:nvPr>
         </p:nvGraphicFramePr>
         <p:xfrm>
-          <a:off x="311700" y="4041405"/>
-          <a:ext cx="8520600" cy="1462980"/>
+          <a:off x="311700" y="3374134"/>
+          <a:ext cx="8520600" cy="1465454"/>
         </p:xfrm>
         <a:graphic>
           <a:graphicData uri="http://schemas.openxmlformats.org/drawingml/2006/table">
@@ -8176,7 +8856,7 @@
                   </a:extLst>
                 </a:gridCol>
               </a:tblGrid>
-              <a:tr h="381000">
+              <a:tr h="459644">
                 <a:tc>
                   <a:txBody>
                     <a:bodyPr/>
@@ -8237,7 +8917,7 @@
                   </a:ext>
                 </a:extLst>
               </a:tr>
-              <a:tr h="396200">
+              <a:tr h="599650">
                 <a:tc>
                   <a:txBody>
                     <a:bodyPr/>
@@ -8254,7 +8934,7 @@
                       </a:pPr>
                       <a:r>
                         <a:rPr lang="en-US" sz="1800" dirty="0"/>
-                        <a:t>Run program</a:t>
+                        <a:t>Run Program</a:t>
                       </a:r>
                       <a:endParaRPr sz="1800" dirty="0"/>
                     </a:p>
@@ -8277,7 +8957,7 @@
                       </a:pPr>
                       <a:r>
                         <a:rPr lang="en-US" sz="1800" dirty="0"/>
-                        <a:t>Main and welcome run correctly.</a:t>
+                        <a:t>Enter p program prints pickup</a:t>
                       </a:r>
                     </a:p>
                     <a:p>
@@ -8292,7 +8972,26 @@
                       </a:pPr>
                       <a:r>
                         <a:rPr lang="en-US" sz="1800" dirty="0"/>
-                        <a:t>Welcome message prints with random name.</a:t>
+                        <a:t>Enter d program prints delivery</a:t>
+                      </a:r>
+                    </a:p>
+                    <a:p>
+                      <a:pPr marL="0" lvl="0" indent="0" algn="l" rtl="0">
+                        <a:spcBef>
+                          <a:spcPts val="0"/>
+                        </a:spcBef>
+                        <a:spcAft>
+                          <a:spcPts val="0"/>
+                        </a:spcAft>
+                        <a:buNone/>
+                      </a:pPr>
+                      <a:r>
+                        <a:rPr lang="en-US" sz="1800" dirty="0"/>
+                        <a:t>Enter invalid </a:t>
+                      </a:r>
+                      <a:r>
+                        <a:rPr lang="en-US" sz="1800"/>
+                        <a:t>program stops</a:t>
                       </a:r>
                       <a:endParaRPr sz="1800" dirty="0"/>
                     </a:p>
@@ -8311,10 +9010,10 @@
       </p:graphicFrame>
       <p:pic>
         <p:nvPicPr>
-          <p:cNvPr id="4" name="Picture 3">
+          <p:cNvPr id="3" name="Picture 2">
             <a:extLst>
               <a:ext uri="{FF2B5EF4-FFF2-40B4-BE49-F238E27FC236}">
-                <a16:creationId xmlns:a16="http://schemas.microsoft.com/office/drawing/2014/main" id="{9FA3FEA3-93DC-4863-83D8-D43DE08F33E4}"/>
+                <a16:creationId xmlns:a16="http://schemas.microsoft.com/office/drawing/2014/main" id="{5CE9BC96-1F1B-42C2-B0C6-A21EEFD67BC8}"/>
               </a:ext>
             </a:extLst>
           </p:cNvPr>
@@ -8331,68 +9030,8 @@
         </p:blipFill>
         <p:spPr>
           <a:xfrm>
-            <a:off x="0" y="1017725"/>
-            <a:ext cx="3503500" cy="1413106"/>
-          </a:xfrm>
-          <a:prstGeom prst="rect">
-            <a:avLst/>
-          </a:prstGeom>
-        </p:spPr>
-      </p:pic>
-      <p:pic>
-        <p:nvPicPr>
-          <p:cNvPr id="5" name="Picture 4">
-            <a:extLst>
-              <a:ext uri="{FF2B5EF4-FFF2-40B4-BE49-F238E27FC236}">
-                <a16:creationId xmlns:a16="http://schemas.microsoft.com/office/drawing/2014/main" id="{702EA7C5-6865-4037-AD46-0422C73CE936}"/>
-              </a:ext>
-            </a:extLst>
-          </p:cNvPr>
-          <p:cNvPicPr>
-            <a:picLocks noChangeAspect="1"/>
-          </p:cNvPicPr>
-          <p:nvPr/>
-        </p:nvPicPr>
-        <p:blipFill>
-          <a:blip r:embed="rId4"/>
-          <a:stretch>
-            <a:fillRect/>
-          </a:stretch>
-        </p:blipFill>
-        <p:spPr>
-          <a:xfrm>
-            <a:off x="0" y="2430831"/>
-            <a:ext cx="3503500" cy="1147755"/>
-          </a:xfrm>
-          <a:prstGeom prst="rect">
-            <a:avLst/>
-          </a:prstGeom>
-        </p:spPr>
-      </p:pic>
-      <p:pic>
-        <p:nvPicPr>
-          <p:cNvPr id="3" name="Picture 2">
-            <a:extLst>
-              <a:ext uri="{FF2B5EF4-FFF2-40B4-BE49-F238E27FC236}">
-                <a16:creationId xmlns:a16="http://schemas.microsoft.com/office/drawing/2014/main" id="{37248A6E-BFDC-4B38-AD41-6E3AE9890C8A}"/>
-              </a:ext>
-            </a:extLst>
-          </p:cNvPr>
-          <p:cNvPicPr>
-            <a:picLocks noChangeAspect="1"/>
-          </p:cNvPicPr>
-          <p:nvPr/>
-        </p:nvPicPr>
-        <p:blipFill>
-          <a:blip r:embed="rId5"/>
-          <a:stretch>
-            <a:fillRect/>
-          </a:stretch>
-        </p:blipFill>
-        <p:spPr>
-          <a:xfrm>
-            <a:off x="3564266" y="1878353"/>
-            <a:ext cx="5207268" cy="552478"/>
+            <a:off x="2518881" y="1017725"/>
+            <a:ext cx="3658399" cy="2286044"/>
           </a:xfrm>
           <a:prstGeom prst="rect">
             <a:avLst/>
@@ -8402,7 +9041,7 @@
     </p:spTree>
     <p:extLst>
       <p:ext uri="{BB962C8B-B14F-4D97-AF65-F5344CB8AC3E}">
-        <p14:creationId xmlns:p14="http://schemas.microsoft.com/office/powerpoint/2010/main" val="676409526"/>
+        <p14:creationId xmlns:p14="http://schemas.microsoft.com/office/powerpoint/2010/main" val="2394897313"/>
       </p:ext>
     </p:extLst>
   </p:cSld>
@@ -8425,7 +9064,7 @@
     </p:bg>
     <p:spTree>
       <p:nvGrpSpPr>
-        <p:cNvPr id="1" name="Shape 83"/>
+        <p:cNvPr id="1" name="Shape 72"/>
         <p:cNvGrpSpPr/>
         <p:nvPr/>
       </p:nvGrpSpPr>
@@ -8439,7 +9078,7 @@
       </p:grpSpPr>
       <p:sp>
         <p:nvSpPr>
-          <p:cNvPr id="84" name="Google Shape;84;p18"/>
+          <p:cNvPr id="73" name="Google Shape;73;p16"/>
           <p:cNvSpPr txBox="1">
             <a:spLocks noGrp="1"/>
           </p:cNvSpPr>
@@ -8472,56 +9111,52 @@
               <a:buNone/>
             </a:pPr>
             <a:r>
-              <a:rPr lang="en"/>
-              <a:t>Version Control Evidence</a:t>
+              <a:rPr lang="en" dirty="0"/>
+              <a:t>Component 2 (Trello screenshot)</a:t>
             </a:r>
-            <a:endParaRPr/>
+            <a:br>
+              <a:rPr lang="en" dirty="0"/>
+            </a:br>
+            <a:endParaRPr dirty="0"/>
           </a:p>
         </p:txBody>
       </p:sp>
-      <p:sp>
-        <p:nvSpPr>
-          <p:cNvPr id="85" name="Google Shape;85;p18"/>
-          <p:cNvSpPr txBox="1">
-            <a:spLocks noGrp="1"/>
-          </p:cNvSpPr>
-          <p:nvPr>
-            <p:ph type="body" idx="1"/>
-          </p:nvPr>
-        </p:nvSpPr>
+      <p:pic>
+        <p:nvPicPr>
+          <p:cNvPr id="3" name="Picture 2">
+            <a:extLst>
+              <a:ext uri="{FF2B5EF4-FFF2-40B4-BE49-F238E27FC236}">
+                <a16:creationId xmlns:a16="http://schemas.microsoft.com/office/drawing/2014/main" id="{819435B8-C1E8-4E01-8C1C-133452C2CFF2}"/>
+              </a:ext>
+            </a:extLst>
+          </p:cNvPr>
+          <p:cNvPicPr>
+            <a:picLocks noChangeAspect="1"/>
+          </p:cNvPicPr>
+          <p:nvPr/>
+        </p:nvPicPr>
+        <p:blipFill>
+          <a:blip r:embed="rId3"/>
+          <a:stretch>
+            <a:fillRect/>
+          </a:stretch>
+        </p:blipFill>
         <p:spPr>
           <a:xfrm>
-            <a:off x="311700" y="1152475"/>
-            <a:ext cx="8464200" cy="3739200"/>
+            <a:off x="228377" y="1457267"/>
+            <a:ext cx="8687246" cy="2228965"/>
           </a:xfrm>
           <a:prstGeom prst="rect">
             <a:avLst/>
           </a:prstGeom>
         </p:spPr>
-        <p:txBody>
-          <a:bodyPr spcFirstLastPara="1" wrap="square" lIns="91425" tIns="91425" rIns="91425" bIns="91425" anchor="t" anchorCtr="0">
-            <a:noAutofit/>
-          </a:bodyPr>
-          <a:lstStyle/>
-          <a:p>
-            <a:pPr marL="0" lvl="0" indent="0" algn="l" rtl="0">
-              <a:spcBef>
-                <a:spcPts val="0"/>
-              </a:spcBef>
-              <a:spcAft>
-                <a:spcPts val="1600"/>
-              </a:spcAft>
-              <a:buNone/>
-            </a:pPr>
-            <a:r>
-              <a:rPr lang="en" i="1"/>
-              <a:t>Your version control evidence should go here.  This could be in the form of annotated screenshots which show you you managed this process or you could make a brief screencast explaining how you implemented version control.</a:t>
-            </a:r>
-            <a:endParaRPr i="1"/>
-          </a:p>
-        </p:txBody>
-      </p:sp>
+      </p:pic>
     </p:spTree>
+    <p:extLst>
+      <p:ext uri="{BB962C8B-B14F-4D97-AF65-F5344CB8AC3E}">
+        <p14:creationId xmlns:p14="http://schemas.microsoft.com/office/powerpoint/2010/main" val="842877212"/>
+      </p:ext>
+    </p:extLst>
   </p:cSld>
   <p:clrMapOvr>
     <a:masterClrMapping/>
@@ -9092,18 +9727,18 @@
 </file>
 
 <file path=customXml/item1.xml><?xml version="1.0" encoding="utf-8"?>
+<p:properties xmlns:p="http://schemas.microsoft.com/office/2006/metadata/properties" xmlns:xsi="http://www.w3.org/2001/XMLSchema-instance" xmlns:pc="http://schemas.microsoft.com/office/infopath/2007/PartnerControls">
+  <documentManagement/>
+</p:properties>
+</file>
+
+<file path=customXml/item2.xml><?xml version="1.0" encoding="utf-8"?>
 <?mso-contentType ?>
 <FormTemplates xmlns="http://schemas.microsoft.com/sharepoint/v3/contenttype/forms">
   <Display>DocumentLibraryForm</Display>
   <Edit>DocumentLibraryForm</Edit>
   <New>DocumentLibraryForm</New>
 </FormTemplates>
-</file>
-
-<file path=customXml/item2.xml><?xml version="1.0" encoding="utf-8"?>
-<p:properties xmlns:p="http://schemas.microsoft.com/office/2006/metadata/properties" xmlns:xsi="http://www.w3.org/2001/XMLSchema-instance" xmlns:pc="http://schemas.microsoft.com/office/infopath/2007/PartnerControls">
-  <documentManagement/>
-</p:properties>
 </file>
 
 <file path=customXml/item3.xml><?xml version="1.0" encoding="utf-8"?>
@@ -9292,14 +9927,6 @@
 </file>
 
 <file path=customXml/itemProps1.xml><?xml version="1.0" encoding="utf-8"?>
-<ds:datastoreItem xmlns:ds="http://schemas.openxmlformats.org/officeDocument/2006/customXml" ds:itemID="{DDD369E5-45BD-4F6E-934F-A24716F69B59}">
-  <ds:schemaRefs>
-    <ds:schemaRef ds:uri="http://schemas.microsoft.com/sharepoint/v3/contenttype/forms"/>
-  </ds:schemaRefs>
-</ds:datastoreItem>
-</file>
-
-<file path=customXml/itemProps2.xml><?xml version="1.0" encoding="utf-8"?>
 <ds:datastoreItem xmlns:ds="http://schemas.openxmlformats.org/officeDocument/2006/customXml" ds:itemID="{E89CEDA1-6C0E-4489-8574-46B725E977F6}">
   <ds:schemaRefs>
     <ds:schemaRef ds:uri="http://schemas.microsoft.com/office/2006/documentManagement/types"/>
@@ -9312,6 +9939,14 @@
     <ds:schemaRef ds:uri="http://schemas.openxmlformats.org/package/2006/metadata/core-properties"/>
     <ds:schemaRef ds:uri="42d4439d-bb2d-40df-8d30-57a312ac786f"/>
     <ds:schemaRef ds:uri="http://www.w3.org/XML/1998/namespace"/>
+  </ds:schemaRefs>
+</ds:datastoreItem>
+</file>
+
+<file path=customXml/itemProps2.xml><?xml version="1.0" encoding="utf-8"?>
+<ds:datastoreItem xmlns:ds="http://schemas.openxmlformats.org/officeDocument/2006/customXml" ds:itemID="{DDD369E5-45BD-4F6E-934F-A24716F69B59}">
+  <ds:schemaRefs>
+    <ds:schemaRef ds:uri="http://schemas.microsoft.com/sharepoint/v3/contenttype/forms"/>
   </ds:schemaRefs>
 </ds:datastoreItem>
 </file>

</xml_diff>